<commit_message>
updated exercises and added small data files
</commit_message>
<xml_diff>
--- a/docs/ioanna_antonio_week_3_analysis_practical.pptx
+++ b/docs/ioanna_antonio_week_3_analysis_practical.pptx
@@ -199,7 +199,7 @@
           <a:p>
             <a:fld id="{E63B2B30-6B68-5649-8E90-3E3C690752BE}" type="datetimeFigureOut">
               <a:rPr lang="en-GB" smtClean="0"/>
-              <a:t>31/01/2018</a:t>
+              <a:t>24/01/2019</a:t>
             </a:fld>
             <a:endParaRPr lang="en-GB"/>
           </a:p>
@@ -682,7 +682,7 @@
           <a:p>
             <a:fld id="{D79BA4B9-CCE6-C14B-A854-25D57FDC82A2}" type="datetimeFigureOut">
               <a:rPr lang="en-GB" smtClean="0"/>
-              <a:t>31/01/2018</a:t>
+              <a:t>24/01/2019</a:t>
             </a:fld>
             <a:endParaRPr lang="en-GB"/>
           </a:p>
@@ -852,7 +852,7 @@
           <a:p>
             <a:fld id="{D79BA4B9-CCE6-C14B-A854-25D57FDC82A2}" type="datetimeFigureOut">
               <a:rPr lang="en-GB" smtClean="0"/>
-              <a:t>31/01/2018</a:t>
+              <a:t>24/01/2019</a:t>
             </a:fld>
             <a:endParaRPr lang="en-GB"/>
           </a:p>
@@ -1032,7 +1032,7 @@
           <a:p>
             <a:fld id="{D79BA4B9-CCE6-C14B-A854-25D57FDC82A2}" type="datetimeFigureOut">
               <a:rPr lang="en-GB" smtClean="0"/>
-              <a:t>31/01/2018</a:t>
+              <a:t>24/01/2019</a:t>
             </a:fld>
             <a:endParaRPr lang="en-GB"/>
           </a:p>
@@ -1202,7 +1202,7 @@
           <a:p>
             <a:fld id="{D79BA4B9-CCE6-C14B-A854-25D57FDC82A2}" type="datetimeFigureOut">
               <a:rPr lang="en-GB" smtClean="0"/>
-              <a:t>31/01/2018</a:t>
+              <a:t>24/01/2019</a:t>
             </a:fld>
             <a:endParaRPr lang="en-GB"/>
           </a:p>
@@ -1448,7 +1448,7 @@
           <a:p>
             <a:fld id="{D79BA4B9-CCE6-C14B-A854-25D57FDC82A2}" type="datetimeFigureOut">
               <a:rPr lang="en-GB" smtClean="0"/>
-              <a:t>31/01/2018</a:t>
+              <a:t>24/01/2019</a:t>
             </a:fld>
             <a:endParaRPr lang="en-GB"/>
           </a:p>
@@ -1680,7 +1680,7 @@
           <a:p>
             <a:fld id="{D79BA4B9-CCE6-C14B-A854-25D57FDC82A2}" type="datetimeFigureOut">
               <a:rPr lang="en-GB" smtClean="0"/>
-              <a:t>31/01/2018</a:t>
+              <a:t>24/01/2019</a:t>
             </a:fld>
             <a:endParaRPr lang="en-GB"/>
           </a:p>
@@ -2047,7 +2047,7 @@
           <a:p>
             <a:fld id="{D79BA4B9-CCE6-C14B-A854-25D57FDC82A2}" type="datetimeFigureOut">
               <a:rPr lang="en-GB" smtClean="0"/>
-              <a:t>31/01/2018</a:t>
+              <a:t>24/01/2019</a:t>
             </a:fld>
             <a:endParaRPr lang="en-GB"/>
           </a:p>
@@ -2165,7 +2165,7 @@
           <a:p>
             <a:fld id="{D79BA4B9-CCE6-C14B-A854-25D57FDC82A2}" type="datetimeFigureOut">
               <a:rPr lang="en-GB" smtClean="0"/>
-              <a:t>31/01/2018</a:t>
+              <a:t>24/01/2019</a:t>
             </a:fld>
             <a:endParaRPr lang="en-GB"/>
           </a:p>
@@ -2260,7 +2260,7 @@
           <a:p>
             <a:fld id="{D79BA4B9-CCE6-C14B-A854-25D57FDC82A2}" type="datetimeFigureOut">
               <a:rPr lang="en-GB" smtClean="0"/>
-              <a:t>31/01/2018</a:t>
+              <a:t>24/01/2019</a:t>
             </a:fld>
             <a:endParaRPr lang="en-GB"/>
           </a:p>
@@ -2537,7 +2537,7 @@
           <a:p>
             <a:fld id="{D79BA4B9-CCE6-C14B-A854-25D57FDC82A2}" type="datetimeFigureOut">
               <a:rPr lang="en-GB" smtClean="0"/>
-              <a:t>31/01/2018</a:t>
+              <a:t>24/01/2019</a:t>
             </a:fld>
             <a:endParaRPr lang="en-GB"/>
           </a:p>
@@ -2790,7 +2790,7 @@
           <a:p>
             <a:fld id="{D79BA4B9-CCE6-C14B-A854-25D57FDC82A2}" type="datetimeFigureOut">
               <a:rPr lang="en-GB" smtClean="0"/>
-              <a:t>31/01/2018</a:t>
+              <a:t>24/01/2019</a:t>
             </a:fld>
             <a:endParaRPr lang="en-GB"/>
           </a:p>
@@ -3003,7 +3003,7 @@
           <a:p>
             <a:fld id="{D79BA4B9-CCE6-C14B-A854-25D57FDC82A2}" type="datetimeFigureOut">
               <a:rPr lang="en-GB" smtClean="0"/>
-              <a:t>31/01/2018</a:t>
+              <a:t>24/01/2019</a:t>
             </a:fld>
             <a:endParaRPr lang="en-GB"/>
           </a:p>
@@ -3585,7 +3585,7 @@
         </p:spPr>
         <p:txBody>
           <a:bodyPr>
-            <a:normAutofit fontScale="85000" lnSpcReduction="20000"/>
+            <a:normAutofit fontScale="92500" lnSpcReduction="10000"/>
           </a:bodyPr>
           <a:lstStyle/>
           <a:p>
@@ -3733,22 +3733,14 @@
             <a:pPr lvl="1"/>
             <a:r>
               <a:rPr lang="en-GB" dirty="0" smtClean="0"/>
-              <a:t>Please bring your computer, work in pairs or make sure there will </a:t>
-            </a:r>
+              <a:t>Please bring your computer, work in pairs or make sure there will be a desktop to use with the required software and packages.</a:t>
+            </a:r>
+          </a:p>
+          <a:p>
+            <a:pPr lvl="1"/>
             <a:r>
               <a:rPr lang="en-GB" dirty="0" smtClean="0"/>
-              <a:t>be a </a:t>
-            </a:r>
-            <a:r>
-              <a:rPr lang="en-GB" dirty="0" smtClean="0"/>
-              <a:t>desktop to use with the required software and packages.</a:t>
-            </a:r>
-          </a:p>
-          <a:p>
-            <a:pPr lvl="1"/>
-            <a:r>
-              <a:rPr lang="en-GB" dirty="0" smtClean="0"/>
-              <a:t>You can preview the </a:t>
+              <a:t>You’ll need to download the </a:t>
             </a:r>
             <a:r>
               <a:rPr lang="en-GB" dirty="0" err="1" smtClean="0"/>
@@ -3756,13 +3748,20 @@
             </a:r>
             <a:r>
               <a:rPr lang="en-GB" dirty="0" smtClean="0"/>
-              <a:t> here:</a:t>
-            </a:r>
-          </a:p>
-          <a:p>
-            <a:pPr marL="457200" lvl="1" indent="0">
-              <a:buNone/>
-            </a:pPr>
+              <a:t> from Blackboard or from:</a:t>
+            </a:r>
+          </a:p>
+          <a:p>
+            <a:pPr lvl="2"/>
+            <a:r>
+              <a:rPr lang="en-GB" dirty="0">
+                <a:hlinkClick r:id="rId3"/>
+              </a:rPr>
+              <a:t>https://github.com/AntonioJBT/teaching_ICL</a:t>
+            </a:r>
+          </a:p>
+          <a:p>
+            <a:pPr lvl="2"/>
             <a:r>
               <a:rPr lang="en-GB" dirty="0" smtClean="0">
                 <a:hlinkClick r:id="rId3"/>
@@ -3779,32 +3778,16 @@
               <a:rPr lang="en-GB" dirty="0" smtClean="0">
                 <a:hlinkClick r:id="rId3"/>
               </a:rPr>
-              <a:t>cdn.rawgit.com/AntonioJBT/teaching_ICL/0e11ceea/code/week_3_analysis_practical_1.nb.html</a:t>
+              <a:t>github.com/AntonioJBT/teaching_ICL/tree/master/code</a:t>
             </a:r>
             <a:endParaRPr lang="en-GB" dirty="0" smtClean="0"/>
           </a:p>
           <a:p>
-            <a:pPr marL="457200" lvl="1" indent="0">
-              <a:buNone/>
-            </a:pPr>
-            <a:r>
-              <a:rPr lang="en-GB" dirty="0">
-                <a:hlinkClick r:id="rId4"/>
-              </a:rPr>
-              <a:t>https://</a:t>
-            </a:r>
-            <a:r>
-              <a:rPr lang="en-GB" dirty="0" smtClean="0">
-                <a:hlinkClick r:id="rId4"/>
-              </a:rPr>
-              <a:t>cdn.rawgit.com/AntonioJBT/teaching_ICL/0e11ceea/code/week_3_analysis_practical_2.nb.html</a:t>
-            </a:r>
+            <a:pPr lvl="2"/>
             <a:endParaRPr lang="en-GB" dirty="0" smtClean="0"/>
           </a:p>
           <a:p>
-            <a:pPr marL="457200" lvl="1" indent="0">
-              <a:buNone/>
-            </a:pPr>
+            <a:pPr lvl="1"/>
             <a:endParaRPr lang="en-GB" dirty="0"/>
           </a:p>
           <a:p>

</xml_diff>